<commit_message>
Updated Cafe Talk v03
</commit_message>
<xml_diff>
--- a/CafeTalks/20170604_CafeTalkIPresentation_v03.pptx
+++ b/CafeTalks/20170604_CafeTalkIPresentation_v03.pptx
@@ -10,15 +10,15 @@
   <p:sldIdLst>
     <p:sldId id="258" r:id="rId7"/>
     <p:sldId id="268" r:id="rId8"/>
-    <p:sldId id="260" r:id="rId9"/>
-    <p:sldId id="261" r:id="rId10"/>
-    <p:sldId id="269" r:id="rId11"/>
+    <p:sldId id="261" r:id="rId9"/>
+    <p:sldId id="269" r:id="rId10"/>
+    <p:sldId id="263" r:id="rId11"/>
     <p:sldId id="271" r:id="rId12"/>
-    <p:sldId id="263" r:id="rId13"/>
-    <p:sldId id="267" r:id="rId14"/>
-    <p:sldId id="265" r:id="rId15"/>
-    <p:sldId id="266" r:id="rId16"/>
-    <p:sldId id="272" r:id="rId17"/>
+    <p:sldId id="267" r:id="rId13"/>
+    <p:sldId id="265" r:id="rId14"/>
+    <p:sldId id="266" r:id="rId15"/>
+    <p:sldId id="275" r:id="rId16"/>
+    <p:sldId id="274" r:id="rId17"/>
   </p:sldIdLst>
   <p:sldSz cx="12192000" cy="6858000"/>
   <p:notesSz cx="6858000" cy="9144000"/>
@@ -589,11 +589,11 @@
         </c:dLbls>
         <c:gapWidth val="182"/>
         <c:overlap val="100"/>
-        <c:axId val="711894336"/>
-        <c:axId val="711894728"/>
+        <c:axId val="708086312"/>
+        <c:axId val="527639912"/>
       </c:barChart>
       <c:catAx>
-        <c:axId val="711894336"/>
+        <c:axId val="708086312"/>
         <c:scaling>
           <c:orientation val="maxMin"/>
         </c:scaling>
@@ -636,7 +636,7 @@
             <a:endParaRPr lang="en-US"/>
           </a:p>
         </c:txPr>
-        <c:crossAx val="711894728"/>
+        <c:crossAx val="527639912"/>
         <c:crosses val="autoZero"/>
         <c:auto val="1"/>
         <c:lblAlgn val="ctr"/>
@@ -644,7 +644,7 @@
         <c:noMultiLvlLbl val="0"/>
       </c:catAx>
       <c:valAx>
-        <c:axId val="711894728"/>
+        <c:axId val="527639912"/>
         <c:scaling>
           <c:orientation val="minMax"/>
           <c:min val="42879"/>
@@ -696,7 +696,7 @@
             <a:endParaRPr lang="en-US"/>
           </a:p>
         </c:txPr>
-        <c:crossAx val="711894336"/>
+        <c:crossAx val="708086312"/>
         <c:crosses val="autoZero"/>
         <c:crossBetween val="between"/>
       </c:valAx>
@@ -1365,7 +1365,7 @@
           <a:p>
             <a:fld id="{2B431595-44DA-4FEC-B837-7EF25C36E313}" type="datetimeFigureOut">
               <a:rPr lang="en-US" smtClean="0"/>
-              <a:t>6/5/2017</a:t>
+              <a:t>6/6/2017</a:t>
             </a:fld>
             <a:endParaRPr lang="en-US"/>
           </a:p>
@@ -2115,7 +2115,7 @@
           <a:p>
             <a:fld id="{F9B74556-12F9-40FA-BD29-031FD15AF59E}" type="datetimeFigureOut">
               <a:rPr lang="en-US" smtClean="0"/>
-              <a:t>6/5/2017</a:t>
+              <a:t>6/6/2017</a:t>
             </a:fld>
             <a:endParaRPr lang="en-US"/>
           </a:p>
@@ -2283,7 +2283,7 @@
           <a:p>
             <a:fld id="{F9B74556-12F9-40FA-BD29-031FD15AF59E}" type="datetimeFigureOut">
               <a:rPr lang="en-US" smtClean="0"/>
-              <a:t>6/5/2017</a:t>
+              <a:t>6/6/2017</a:t>
             </a:fld>
             <a:endParaRPr lang="en-US"/>
           </a:p>
@@ -2461,7 +2461,7 @@
           <a:p>
             <a:fld id="{F9B74556-12F9-40FA-BD29-031FD15AF59E}" type="datetimeFigureOut">
               <a:rPr lang="en-US" smtClean="0"/>
-              <a:t>6/5/2017</a:t>
+              <a:t>6/6/2017</a:t>
             </a:fld>
             <a:endParaRPr lang="en-US"/>
           </a:p>
@@ -2929,7 +2929,7 @@
           <a:p>
             <a:fld id="{F9B74556-12F9-40FA-BD29-031FD15AF59E}" type="datetimeFigureOut">
               <a:rPr lang="en-US" smtClean="0"/>
-              <a:t>6/5/2017</a:t>
+              <a:t>6/6/2017</a:t>
             </a:fld>
             <a:endParaRPr lang="en-US"/>
           </a:p>
@@ -3174,7 +3174,7 @@
           <a:p>
             <a:fld id="{F9B74556-12F9-40FA-BD29-031FD15AF59E}" type="datetimeFigureOut">
               <a:rPr lang="en-US" smtClean="0"/>
-              <a:t>6/5/2017</a:t>
+              <a:t>6/6/2017</a:t>
             </a:fld>
             <a:endParaRPr lang="en-US"/>
           </a:p>
@@ -3403,7 +3403,7 @@
           <a:p>
             <a:fld id="{F9B74556-12F9-40FA-BD29-031FD15AF59E}" type="datetimeFigureOut">
               <a:rPr lang="en-US" smtClean="0"/>
-              <a:t>6/5/2017</a:t>
+              <a:t>6/6/2017</a:t>
             </a:fld>
             <a:endParaRPr lang="en-US"/>
           </a:p>
@@ -3767,7 +3767,7 @@
           <a:p>
             <a:fld id="{F9B74556-12F9-40FA-BD29-031FD15AF59E}" type="datetimeFigureOut">
               <a:rPr lang="en-US" smtClean="0"/>
-              <a:t>6/5/2017</a:t>
+              <a:t>6/6/2017</a:t>
             </a:fld>
             <a:endParaRPr lang="en-US"/>
           </a:p>
@@ -3884,7 +3884,7 @@
           <a:p>
             <a:fld id="{F9B74556-12F9-40FA-BD29-031FD15AF59E}" type="datetimeFigureOut">
               <a:rPr lang="en-US" smtClean="0"/>
-              <a:t>6/5/2017</a:t>
+              <a:t>6/6/2017</a:t>
             </a:fld>
             <a:endParaRPr lang="en-US"/>
           </a:p>
@@ -3979,7 +3979,7 @@
           <a:p>
             <a:fld id="{F9B74556-12F9-40FA-BD29-031FD15AF59E}" type="datetimeFigureOut">
               <a:rPr lang="en-US" smtClean="0"/>
-              <a:t>6/5/2017</a:t>
+              <a:t>6/6/2017</a:t>
             </a:fld>
             <a:endParaRPr lang="en-US"/>
           </a:p>
@@ -4254,7 +4254,7 @@
           <a:p>
             <a:fld id="{F9B74556-12F9-40FA-BD29-031FD15AF59E}" type="datetimeFigureOut">
               <a:rPr lang="en-US" smtClean="0"/>
-              <a:t>6/5/2017</a:t>
+              <a:t>6/6/2017</a:t>
             </a:fld>
             <a:endParaRPr lang="en-US"/>
           </a:p>
@@ -4465,7 +4465,7 @@
           <a:p>
             <a:fld id="{F9B74556-12F9-40FA-BD29-031FD15AF59E}" type="datetimeFigureOut">
               <a:rPr lang="en-US" smtClean="0"/>
-              <a:t>6/5/2017</a:t>
+              <a:t>6/6/2017</a:t>
             </a:fld>
             <a:endParaRPr lang="en-US"/>
           </a:p>
@@ -5075,133 +5075,81 @@
           <a:lstStyle/>
           <a:p>
             <a:r>
-              <a:rPr lang="en-US" sz="1800" dirty="0" smtClean="0">
-                <a:solidFill>
-                  <a:schemeClr val="tx1"/>
-                </a:solidFill>
-              </a:rPr>
-              <a:t>Creation of an adequate data set of labeled/</a:t>
-            </a:r>
-            <a:r>
-              <a:rPr lang="en-US" sz="1800" dirty="0" err="1" smtClean="0">
-                <a:solidFill>
-                  <a:schemeClr val="tx1"/>
-                </a:solidFill>
-              </a:rPr>
-              <a:t>wireframed</a:t>
-            </a:r>
-            <a:r>
-              <a:rPr lang="en-US" sz="1800" dirty="0" smtClean="0">
-                <a:solidFill>
-                  <a:schemeClr val="tx1"/>
-                </a:solidFill>
-              </a:rPr>
-              <a:t> images for training model</a:t>
+              <a:rPr lang="en-US" dirty="0" smtClean="0"/>
+              <a:t>Computing Power Requirements</a:t>
             </a:r>
           </a:p>
           <a:p>
             <a:pPr lvl="1"/>
             <a:r>
-              <a:rPr lang="en-US" sz="1600" dirty="0" smtClean="0">
-                <a:solidFill>
-                  <a:schemeClr val="tx1"/>
-                </a:solidFill>
-              </a:rPr>
-              <a:t>This is a lot of hands on time!</a:t>
+              <a:rPr lang="en-US" dirty="0" smtClean="0"/>
+              <a:t>Training of the Convolutional Neural Network requires repetitive processing of chunks of the image</a:t>
             </a:r>
           </a:p>
           <a:p>
             <a:pPr lvl="1"/>
             <a:r>
-              <a:rPr lang="en-US" sz="1600" dirty="0" smtClean="0">
-                <a:solidFill>
-                  <a:schemeClr val="tx1"/>
-                </a:solidFill>
-              </a:rPr>
-              <a:t>There’s probably a best method of performing this task, that we hope to uncover through prior research</a:t>
+              <a:rPr lang="en-US" dirty="0" smtClean="0"/>
+              <a:t>Campus super computing resources will be needed</a:t>
+            </a:r>
+            <a:endParaRPr lang="en-US" dirty="0" smtClean="0"/>
+          </a:p>
+          <a:p>
+            <a:endParaRPr lang="en-US" dirty="0" smtClean="0"/>
+          </a:p>
+          <a:p>
+            <a:r>
+              <a:rPr lang="en-US" dirty="0" smtClean="0"/>
+              <a:t>Image Storage for Training and Processing</a:t>
             </a:r>
           </a:p>
           <a:p>
             <a:pPr lvl="1"/>
-            <a:endParaRPr lang="en-US" sz="1600" dirty="0">
-              <a:solidFill>
-                <a:schemeClr val="tx1"/>
-              </a:solidFill>
-            </a:endParaRPr>
-          </a:p>
-          <a:p>
-            <a:r>
-              <a:rPr lang="en-US" dirty="0" smtClean="0">
-                <a:solidFill>
-                  <a:schemeClr val="tx1"/>
-                </a:solidFill>
-              </a:rPr>
-              <a:t>Integration with prior data collection from UMD Project Sidewalk team</a:t>
+            <a:r>
+              <a:rPr lang="en-US" dirty="0" smtClean="0"/>
+              <a:t>Google SV images can be transitive, and not permanent.  Using linked files versus warehoused means labeling might apply to an image no longer available</a:t>
+            </a:r>
+            <a:endParaRPr lang="en-US" dirty="0"/>
+          </a:p>
+          <a:p>
+            <a:endParaRPr lang="en-US" dirty="0" smtClean="0"/>
+          </a:p>
+          <a:p>
+            <a:r>
+              <a:rPr lang="en-US" dirty="0" smtClean="0"/>
+              <a:t>Are </a:t>
+            </a:r>
+            <a:r>
+              <a:rPr lang="en-US" dirty="0" smtClean="0"/>
+              <a:t>underserved areas usually comprised of low-income or disadvantaged house holds</a:t>
+            </a:r>
+            <a:r>
+              <a:rPr lang="en-US" dirty="0" smtClean="0"/>
+              <a:t>?</a:t>
+            </a:r>
+          </a:p>
+          <a:p>
+            <a:endParaRPr lang="en-US" dirty="0"/>
+          </a:p>
+          <a:p>
+            <a:r>
+              <a:rPr lang="en-US" dirty="0" smtClean="0"/>
+              <a:t>Development of Sidewalk scoring methodology</a:t>
             </a:r>
           </a:p>
           <a:p>
             <a:pPr lvl="1"/>
             <a:r>
-              <a:rPr lang="en-US" dirty="0" smtClean="0">
-                <a:solidFill>
-                  <a:schemeClr val="tx1"/>
-                </a:solidFill>
-              </a:rPr>
-              <a:t>Existing base of ~67,000 labeled images</a:t>
-            </a:r>
-          </a:p>
-          <a:p>
-            <a:pPr lvl="1"/>
-            <a:endParaRPr lang="en-US" dirty="0">
-              <a:solidFill>
-                <a:schemeClr val="tx1"/>
-              </a:solidFill>
-            </a:endParaRPr>
-          </a:p>
-          <a:p>
-            <a:r>
-              <a:rPr lang="en-US" dirty="0" smtClean="0">
-                <a:solidFill>
-                  <a:schemeClr val="tx1"/>
-                </a:solidFill>
-              </a:rPr>
-              <a:t>Learning the available convolutional neural network libraries/packages</a:t>
-            </a:r>
-          </a:p>
-          <a:p>
-            <a:pPr lvl="1"/>
-            <a:endParaRPr lang="en-US" sz="1600" dirty="0">
-              <a:solidFill>
-                <a:schemeClr val="tx1"/>
-              </a:solidFill>
-            </a:endParaRPr>
-          </a:p>
-          <a:p>
-            <a:pPr lvl="1"/>
-            <a:endParaRPr lang="en-US" sz="1600" dirty="0" smtClean="0">
-              <a:solidFill>
-                <a:schemeClr val="tx1"/>
-              </a:solidFill>
-            </a:endParaRPr>
-          </a:p>
-          <a:p>
-            <a:pPr lvl="1"/>
-            <a:endParaRPr lang="en-US" sz="1600" dirty="0">
-              <a:solidFill>
-                <a:schemeClr val="tx1"/>
-              </a:solidFill>
-            </a:endParaRPr>
-          </a:p>
-          <a:p>
-            <a:pPr lvl="1"/>
-            <a:endParaRPr lang="en-US" sz="1600" dirty="0">
-              <a:solidFill>
-                <a:schemeClr val="tx1"/>
-              </a:solidFill>
-            </a:endParaRPr>
-          </a:p>
-          <a:p>
-            <a:endParaRPr lang="en-US" sz="1800" dirty="0"/>
+              <a:rPr lang="en-US" dirty="0" smtClean="0"/>
+              <a:t>Will require consultation with domain scoring experts</a:t>
+            </a:r>
+            <a:endParaRPr lang="en-US" dirty="0" smtClean="0"/>
+          </a:p>
+          <a:p>
+            <a:endParaRPr lang="en-US" dirty="0"/>
+          </a:p>
+          <a:p>
+            <a:endParaRPr lang="en-US" dirty="0"/>
           </a:p>
         </p:txBody>
       </p:sp>
@@ -5258,7 +5206,7 @@
                 <a:latin typeface="Arial" panose="020B0604020202020204" pitchFamily="34" charset="0"/>
                 <a:cs typeface="Arial" panose="020B0604020202020204" pitchFamily="34" charset="0"/>
               </a:rPr>
-              <a:t>Major Steps</a:t>
+              <a:t>Hurdles and Challenges</a:t>
             </a:r>
             <a:endParaRPr lang="en-US" sz="2400" b="1" dirty="0">
               <a:solidFill>
@@ -5273,7 +5221,7 @@
     </p:spTree>
     <p:extLst>
       <p:ext uri="{BB962C8B-B14F-4D97-AF65-F5344CB8AC3E}">
-        <p14:creationId xmlns:p14="http://schemas.microsoft.com/office/powerpoint/2010/main" val="3263685899"/>
+        <p14:creationId xmlns:p14="http://schemas.microsoft.com/office/powerpoint/2010/main" val="1118869581"/>
       </p:ext>
     </p:extLst>
   </p:cSld>
@@ -5307,116 +5255,99 @@
           <a:chExt cx="0" cy="0"/>
         </a:xfrm>
       </p:grpSpPr>
-      <p:sp>
-        <p:nvSpPr>
-          <p:cNvPr id="2" name="Content Placeholder 1"/>
+      <p:pic>
+        <p:nvPicPr>
+          <p:cNvPr id="5" name="Picture 4"/>
+          <p:cNvPicPr>
+            <a:picLocks noChangeAspect="1"/>
+          </p:cNvPicPr>
+          <p:nvPr/>
+        </p:nvPicPr>
+        <p:blipFill>
+          <a:blip r:embed="rId2" cstate="print">
+            <a:extLst>
+              <a:ext uri="{28A0092B-C50C-407E-A947-70E740481C1C}">
+                <a14:useLocalDpi xmlns:a14="http://schemas.microsoft.com/office/drawing/2010/main" val="0"/>
+              </a:ext>
+            </a:extLst>
+          </a:blip>
+          <a:stretch>
+            <a:fillRect/>
+          </a:stretch>
+        </p:blipFill>
+        <p:spPr>
+          <a:xfrm>
+            <a:off x="3638550" y="1980441"/>
+            <a:ext cx="1390650" cy="1390650"/>
+          </a:xfrm>
+          <a:prstGeom prst="rect">
+            <a:avLst/>
+          </a:prstGeom>
+        </p:spPr>
+      </p:pic>
+      <p:pic>
+        <p:nvPicPr>
+          <p:cNvPr id="6" name="Picture 5"/>
+          <p:cNvPicPr>
+            <a:picLocks noChangeAspect="1"/>
+          </p:cNvPicPr>
+          <p:nvPr/>
+        </p:nvPicPr>
+        <p:blipFill>
+          <a:blip r:embed="rId3" cstate="print">
+            <a:extLst>
+              <a:ext uri="{28A0092B-C50C-407E-A947-70E740481C1C}">
+                <a14:useLocalDpi xmlns:a14="http://schemas.microsoft.com/office/drawing/2010/main" val="0"/>
+              </a:ext>
+            </a:extLst>
+          </a:blip>
+          <a:stretch>
+            <a:fillRect/>
+          </a:stretch>
+        </p:blipFill>
+        <p:spPr>
+          <a:xfrm>
+            <a:off x="5138928" y="1980441"/>
+            <a:ext cx="2642997" cy="1371509"/>
+          </a:xfrm>
+          <a:prstGeom prst="rect">
+            <a:avLst/>
+          </a:prstGeom>
+        </p:spPr>
+      </p:pic>
+      <p:sp>
+        <p:nvSpPr>
+          <p:cNvPr id="4" name="Title 3"/>
           <p:cNvSpPr>
             <a:spLocks noGrp="1"/>
           </p:cNvSpPr>
           <p:nvPr>
-            <p:ph idx="1"/>
+            <p:ph type="ctrTitle"/>
           </p:nvPr>
         </p:nvSpPr>
-        <p:spPr>
-          <a:xfrm>
-            <a:off x="609600" y="1080293"/>
-            <a:ext cx="10972800" cy="4568031"/>
-          </a:xfrm>
-        </p:spPr>
-        <p:txBody>
-          <a:bodyPr>
-            <a:normAutofit/>
-          </a:bodyPr>
-          <a:lstStyle/>
-          <a:p>
-            <a:r>
-              <a:rPr lang="en-US" sz="1800" dirty="0" smtClean="0"/>
-              <a:t>Are underserved areas usually comprised of low-income or disadvantaged house holds?</a:t>
-            </a:r>
-          </a:p>
-          <a:p>
-            <a:endParaRPr lang="en-US" sz="1800" dirty="0"/>
-          </a:p>
-          <a:p>
-            <a:endParaRPr lang="en-US" sz="1800" dirty="0"/>
-          </a:p>
-        </p:txBody>
-      </p:sp>
-      <p:sp>
-        <p:nvSpPr>
-          <p:cNvPr id="4" name="Slide Number Placeholder 3"/>
-          <p:cNvSpPr>
-            <a:spLocks noGrp="1"/>
-          </p:cNvSpPr>
-          <p:nvPr>
-            <p:ph type="sldNum" sz="quarter" idx="12"/>
-          </p:nvPr>
-        </p:nvSpPr>
         <p:spPr/>
         <p:txBody>
           <a:bodyPr/>
           <a:lstStyle/>
           <a:p>
-            <a:fld id="{B5C1F4F4-A082-40CA-B36A-B0C2125DDA09}" type="slidenum">
-              <a:rPr lang="en-US" smtClean="0"/>
-              <a:t>11</a:t>
-            </a:fld>
-            <a:endParaRPr lang="en-US"/>
-          </a:p>
-        </p:txBody>
-      </p:sp>
-      <p:sp>
-        <p:nvSpPr>
-          <p:cNvPr id="5" name="TextBox 4"/>
-          <p:cNvSpPr txBox="1"/>
-          <p:nvPr/>
-        </p:nvSpPr>
-        <p:spPr>
-          <a:xfrm>
-            <a:off x="609600" y="200025"/>
-            <a:ext cx="10972800" cy="461665"/>
-          </a:xfrm>
-          <a:prstGeom prst="rect">
-            <a:avLst/>
-          </a:prstGeom>
-          <a:noFill/>
-        </p:spPr>
-        <p:txBody>
-          <a:bodyPr wrap="square" rtlCol="0">
-            <a:spAutoFit/>
-          </a:bodyPr>
-          <a:lstStyle/>
-          <a:p>
-            <a:r>
-              <a:rPr lang="en-US" sz="2400" b="1" dirty="0">
-                <a:solidFill>
-                  <a:schemeClr val="accent3"/>
-                </a:solidFill>
-                <a:latin typeface="Arial" panose="020B0604020202020204" pitchFamily="34" charset="0"/>
-                <a:cs typeface="Arial" panose="020B0604020202020204" pitchFamily="34" charset="0"/>
-              </a:rPr>
-              <a:t>Ethics</a:t>
-            </a:r>
+            <a:r>
+              <a:rPr lang="en-US" dirty="0" smtClean="0"/>
+              <a:t>THANK YOU</a:t>
+            </a:r>
+            <a:endParaRPr lang="en-US" dirty="0"/>
           </a:p>
         </p:txBody>
       </p:sp>
     </p:spTree>
     <p:extLst>
       <p:ext uri="{BB962C8B-B14F-4D97-AF65-F5344CB8AC3E}">
-        <p14:creationId xmlns:p14="http://schemas.microsoft.com/office/powerpoint/2010/main" val="4213706921"/>
+        <p14:creationId xmlns:p14="http://schemas.microsoft.com/office/powerpoint/2010/main" val="266927946"/>
       </p:ext>
     </p:extLst>
   </p:cSld>
   <p:clrMapOvr>
     <a:masterClrMapping/>
   </p:clrMapOvr>
-  <p:timing>
-    <p:tnLst>
-      <p:par>
-        <p:cTn id="1" dur="indefinite" restart="never" nodeType="tmRoot"/>
-      </p:par>
-    </p:tnLst>
-  </p:timing>
 </p:sld>
 </file>
 
@@ -5639,150 +5570,6 @@
       </p:grpSpPr>
       <p:sp>
         <p:nvSpPr>
-          <p:cNvPr id="2" name="Content Placeholder 1"/>
-          <p:cNvSpPr>
-            <a:spLocks noGrp="1"/>
-          </p:cNvSpPr>
-          <p:nvPr>
-            <p:ph idx="1"/>
-          </p:nvPr>
-        </p:nvSpPr>
-        <p:spPr/>
-        <p:txBody>
-          <a:bodyPr/>
-          <a:lstStyle/>
-          <a:p>
-            <a:r>
-              <a:rPr lang="en-US" dirty="0">
-                <a:solidFill>
-                  <a:schemeClr val="tx1"/>
-                </a:solidFill>
-              </a:rPr>
-              <a:t>Problem Statement</a:t>
-            </a:r>
-          </a:p>
-          <a:p>
-            <a:r>
-              <a:rPr lang="en-US" dirty="0">
-                <a:solidFill>
-                  <a:schemeClr val="tx1"/>
-                </a:solidFill>
-              </a:rPr>
-              <a:t>Project Plan</a:t>
-            </a:r>
-          </a:p>
-          <a:p>
-            <a:r>
-              <a:rPr lang="en-US" dirty="0">
-                <a:solidFill>
-                  <a:schemeClr val="tx1"/>
-                </a:solidFill>
-              </a:rPr>
-              <a:t>Ethical Consideration</a:t>
-            </a:r>
-          </a:p>
-          <a:p>
-            <a:endParaRPr lang="en-US" dirty="0"/>
-          </a:p>
-        </p:txBody>
-      </p:sp>
-      <p:sp>
-        <p:nvSpPr>
-          <p:cNvPr id="4" name="TextBox 3"/>
-          <p:cNvSpPr txBox="1"/>
-          <p:nvPr/>
-        </p:nvSpPr>
-        <p:spPr>
-          <a:xfrm>
-            <a:off x="609600" y="200025"/>
-            <a:ext cx="10972800" cy="400110"/>
-          </a:xfrm>
-          <a:prstGeom prst="rect">
-            <a:avLst/>
-          </a:prstGeom>
-          <a:noFill/>
-        </p:spPr>
-        <p:txBody>
-          <a:bodyPr wrap="square" rtlCol="0">
-            <a:spAutoFit/>
-          </a:bodyPr>
-          <a:lstStyle/>
-          <a:p>
-            <a:r>
-              <a:rPr lang="en-US" sz="2000" b="1" dirty="0">
-                <a:solidFill>
-                  <a:schemeClr val="accent3"/>
-                </a:solidFill>
-                <a:latin typeface="Arial" panose="020B0604020202020204" pitchFamily="34" charset="0"/>
-                <a:cs typeface="Arial" panose="020B0604020202020204" pitchFamily="34" charset="0"/>
-              </a:rPr>
-              <a:t>Agenda</a:t>
-            </a:r>
-          </a:p>
-        </p:txBody>
-      </p:sp>
-      <p:sp>
-        <p:nvSpPr>
-          <p:cNvPr id="5" name="Slide Number Placeholder 4"/>
-          <p:cNvSpPr>
-            <a:spLocks noGrp="1"/>
-          </p:cNvSpPr>
-          <p:nvPr>
-            <p:ph type="sldNum" sz="quarter" idx="12"/>
-          </p:nvPr>
-        </p:nvSpPr>
-        <p:spPr/>
-        <p:txBody>
-          <a:bodyPr/>
-          <a:lstStyle/>
-          <a:p>
-            <a:fld id="{B5C1F4F4-A082-40CA-B36A-B0C2125DDA09}" type="slidenum">
-              <a:rPr lang="en-US" smtClean="0"/>
-              <a:t>3</a:t>
-            </a:fld>
-            <a:endParaRPr lang="en-US"/>
-          </a:p>
-        </p:txBody>
-      </p:sp>
-    </p:spTree>
-    <p:extLst>
-      <p:ext uri="{BB962C8B-B14F-4D97-AF65-F5344CB8AC3E}">
-        <p14:creationId xmlns:p14="http://schemas.microsoft.com/office/powerpoint/2010/main" val="3000973406"/>
-      </p:ext>
-    </p:extLst>
-  </p:cSld>
-  <p:clrMapOvr>
-    <a:masterClrMapping/>
-  </p:clrMapOvr>
-  <p:timing>
-    <p:tnLst>
-      <p:par>
-        <p:cTn id="1" dur="indefinite" restart="never" nodeType="tmRoot"/>
-      </p:par>
-    </p:tnLst>
-  </p:timing>
-</p:sld>
-</file>
-
-<file path=ppt/slides/slide4.xml><?xml version="1.0" encoding="utf-8"?>
-<p:sld xmlns:a="http://schemas.openxmlformats.org/drawingml/2006/main" xmlns:r="http://schemas.openxmlformats.org/officeDocument/2006/relationships" xmlns:p="http://schemas.openxmlformats.org/presentationml/2006/main">
-  <p:cSld>
-    <p:spTree>
-      <p:nvGrpSpPr>
-        <p:cNvPr id="1" name=""/>
-        <p:cNvGrpSpPr/>
-        <p:nvPr/>
-      </p:nvGrpSpPr>
-      <p:grpSpPr>
-        <a:xfrm>
-          <a:off x="0" y="0"/>
-          <a:ext cx="0" cy="0"/>
-          <a:chOff x="0" y="0"/>
-          <a:chExt cx="0" cy="0"/>
-        </a:xfrm>
-      </p:grpSpPr>
-      <p:sp>
-        <p:nvSpPr>
           <p:cNvPr id="4" name="Slide Number Placeholder 3"/>
           <p:cNvSpPr>
             <a:spLocks noGrp="1"/>
@@ -5798,7 +5585,7 @@
           <a:p>
             <a:fld id="{B5C1F4F4-A082-40CA-B36A-B0C2125DDA09}" type="slidenum">
               <a:rPr lang="en-US" smtClean="0"/>
-              <a:t>4</a:t>
+              <a:t>3</a:t>
             </a:fld>
             <a:endParaRPr lang="en-US"/>
           </a:p>
@@ -6073,94 +5860,54 @@
           </a:lstStyle>
           <a:p>
             <a:r>
-              <a:rPr lang="en-US" sz="1400" dirty="0">
-                <a:solidFill>
-                  <a:schemeClr val="tx1"/>
-                </a:solidFill>
-              </a:rPr>
+              <a:rPr lang="en-US" sz="1400" dirty="0"/>
               <a:t>For a city like Dallas, walkable sidewalks are essential as the city grows in both size and diversity</a:t>
             </a:r>
           </a:p>
           <a:p>
             <a:r>
-              <a:rPr lang="en-US" sz="1400" dirty="0">
-                <a:solidFill>
-                  <a:schemeClr val="tx1"/>
-                </a:solidFill>
-              </a:rPr>
+              <a:rPr lang="en-US" sz="1400" dirty="0"/>
               <a:t>According to Walkscore.com</a:t>
             </a:r>
             <a:r>
-              <a:rPr lang="en-US" sz="1400" baseline="30000" dirty="0">
-                <a:solidFill>
-                  <a:schemeClr val="tx1"/>
-                </a:solidFill>
-              </a:rPr>
+              <a:rPr lang="en-US" sz="1400" baseline="30000" dirty="0"/>
               <a:t>1</a:t>
             </a:r>
             <a:r>
-              <a:rPr lang="en-US" sz="1400" dirty="0">
-                <a:solidFill>
-                  <a:schemeClr val="tx1"/>
-                </a:solidFill>
-              </a:rPr>
+              <a:rPr lang="en-US" sz="1400" dirty="0"/>
               <a:t>, Dallas’ walk score rating is 46.  </a:t>
             </a:r>
           </a:p>
           <a:p>
             <a:pPr lvl="1"/>
             <a:r>
-              <a:rPr lang="en-US" sz="1400" dirty="0">
-                <a:solidFill>
-                  <a:schemeClr val="tx1"/>
-                </a:solidFill>
-              </a:rPr>
+              <a:rPr lang="en-US" sz="1400" dirty="0"/>
               <a:t>This compares to cities such as New York, Boston, and San Francisco which have Walk Scores between 81 and 89</a:t>
             </a:r>
           </a:p>
           <a:p>
             <a:pPr lvl="1"/>
             <a:r>
-              <a:rPr lang="en-US" sz="1400" dirty="0">
-                <a:solidFill>
-                  <a:schemeClr val="tx1"/>
-                </a:solidFill>
-              </a:rPr>
+              <a:rPr lang="en-US" sz="1400" dirty="0"/>
               <a:t>While on par with peer cities such as Houston (49) and Austin (40), Dallas has the opportunity to tailor the infrastructure in place by upgrading areas that need improvement for those citizens who are in the most need</a:t>
             </a:r>
           </a:p>
           <a:p>
             <a:r>
-              <a:rPr lang="en-US" sz="1400" dirty="0">
-                <a:solidFill>
-                  <a:schemeClr val="tx1"/>
-                </a:solidFill>
-              </a:rPr>
+              <a:rPr lang="en-US" sz="1400" dirty="0"/>
               <a:t>The city has added over $16.7M to the annual Street Services</a:t>
             </a:r>
             <a:r>
-              <a:rPr lang="en-US" sz="1400" baseline="30000" dirty="0">
-                <a:solidFill>
-                  <a:schemeClr val="tx1"/>
-                </a:solidFill>
-              </a:rPr>
+              <a:rPr lang="en-US" sz="1400" baseline="30000" dirty="0"/>
               <a:t>2</a:t>
             </a:r>
             <a:r>
-              <a:rPr lang="en-US" sz="1400" dirty="0">
-                <a:solidFill>
-                  <a:schemeClr val="tx1"/>
-                </a:solidFill>
-              </a:rPr>
+              <a:rPr lang="en-US" sz="1400" dirty="0"/>
               <a:t> budget in the past year and the most recent citizen survey places infrastructure improvement as the number one area of importance for Dallas residents</a:t>
             </a:r>
           </a:p>
           <a:p>
-            <a:endParaRPr lang="en-US" sz="1600" dirty="0">
-              <a:solidFill>
-                <a:schemeClr val="tx1"/>
-              </a:solidFill>
-            </a:endParaRPr>
+            <a:endParaRPr lang="en-US" sz="1600" dirty="0"/>
           </a:p>
         </p:txBody>
       </p:sp>
@@ -6225,7 +5972,7 @@
 </p:sld>
 </file>
 
-<file path=ppt/slides/slide5.xml><?xml version="1.0" encoding="utf-8"?>
+<file path=ppt/slides/slide4.xml><?xml version="1.0" encoding="utf-8"?>
 <p:sld xmlns:a="http://schemas.openxmlformats.org/drawingml/2006/main" xmlns:r="http://schemas.openxmlformats.org/officeDocument/2006/relationships" xmlns:p="http://schemas.openxmlformats.org/presentationml/2006/main">
   <p:cSld>
     <p:spTree>
@@ -6259,7 +6006,7 @@
           <a:p>
             <a:fld id="{B5C1F4F4-A082-40CA-B36A-B0C2125DDA09}" type="slidenum">
               <a:rPr lang="en-US" smtClean="0"/>
-              <a:t>5</a:t>
+              <a:t>4</a:t>
             </a:fld>
             <a:endParaRPr lang="en-US"/>
           </a:p>
@@ -6326,7 +6073,7 @@
         </p:nvSpPr>
         <p:spPr>
           <a:xfrm>
-            <a:off x="2974701" y="1971397"/>
+            <a:off x="3099392" y="1441460"/>
             <a:ext cx="274320" cy="274320"/>
           </a:xfrm>
           <a:prstGeom prst="ellipse">
@@ -6369,7 +6116,7 @@
         </p:nvSpPr>
         <p:spPr>
           <a:xfrm>
-            <a:off x="8059319" y="1971397"/>
+            <a:off x="8184010" y="1441460"/>
             <a:ext cx="274320" cy="274320"/>
           </a:xfrm>
           <a:prstGeom prst="ellipse">
@@ -6406,44 +6153,14 @@
       </p:sp>
       <p:sp>
         <p:nvSpPr>
-          <p:cNvPr id="7" name="TextBox 6"/>
-          <p:cNvSpPr txBox="1"/>
-          <p:nvPr/>
-        </p:nvSpPr>
-        <p:spPr>
-          <a:xfrm>
-            <a:off x="4365697" y="1173018"/>
-            <a:ext cx="2576946" cy="646331"/>
-          </a:xfrm>
-          <a:prstGeom prst="rect">
-            <a:avLst/>
-          </a:prstGeom>
-          <a:noFill/>
-        </p:spPr>
-        <p:txBody>
-          <a:bodyPr wrap="square" rtlCol="0">
-            <a:spAutoFit/>
-          </a:bodyPr>
-          <a:lstStyle/>
-          <a:p>
-            <a:pPr algn="ctr"/>
-            <a:r>
-              <a:rPr lang="en-US" dirty="0"/>
-              <a:t>Approaches to creating the data</a:t>
-            </a:r>
-          </a:p>
-        </p:txBody>
-      </p:sp>
-      <p:sp>
-        <p:nvSpPr>
           <p:cNvPr id="8" name="TextBox 7"/>
           <p:cNvSpPr txBox="1"/>
           <p:nvPr/>
         </p:nvSpPr>
         <p:spPr>
           <a:xfrm>
-            <a:off x="1681020" y="2493818"/>
-            <a:ext cx="2863273" cy="307777"/>
+            <a:off x="1805711" y="1963881"/>
+            <a:ext cx="2863273" cy="2893100"/>
           </a:xfrm>
           <a:prstGeom prst="rect">
             <a:avLst/>
@@ -6477,6 +6194,9 @@
               </a:rPr>
               <a:t>Maryland</a:t>
             </a:r>
+          </a:p>
+          <a:p>
+            <a:pPr algn="ctr"/>
             <a:endParaRPr lang="en-US" sz="1400" b="1" dirty="0">
               <a:solidFill>
                 <a:schemeClr val="accent1"/>
@@ -6485,6 +6205,112 @@
               <a:cs typeface="Arial" panose="020B0604020202020204" pitchFamily="34" charset="0"/>
             </a:endParaRPr>
           </a:p>
+          <a:p>
+            <a:r>
+              <a:rPr lang="en-US" sz="1400" b="1" dirty="0" smtClean="0">
+                <a:solidFill>
+                  <a:schemeClr val="accent1"/>
+                </a:solidFill>
+                <a:latin typeface="Arial" panose="020B0604020202020204" pitchFamily="34" charset="0"/>
+                <a:cs typeface="Arial" panose="020B0604020202020204" pitchFamily="34" charset="0"/>
+              </a:rPr>
+              <a:t>Summary: </a:t>
+            </a:r>
+            <a:r>
+              <a:rPr lang="en-US" sz="1400" dirty="0" smtClean="0">
+                <a:solidFill>
+                  <a:schemeClr val="accent1"/>
+                </a:solidFill>
+                <a:latin typeface="Arial" panose="020B0604020202020204" pitchFamily="34" charset="0"/>
+                <a:cs typeface="Arial" panose="020B0604020202020204" pitchFamily="34" charset="0"/>
+              </a:rPr>
+              <a:t>The project has collected and labeled images from Google </a:t>
+            </a:r>
+            <a:r>
+              <a:rPr lang="en-US" sz="1400" dirty="0" err="1" smtClean="0">
+                <a:solidFill>
+                  <a:schemeClr val="accent1"/>
+                </a:solidFill>
+                <a:latin typeface="Arial" panose="020B0604020202020204" pitchFamily="34" charset="0"/>
+                <a:cs typeface="Arial" panose="020B0604020202020204" pitchFamily="34" charset="0"/>
+              </a:rPr>
+              <a:t>StreetView</a:t>
+            </a:r>
+            <a:r>
+              <a:rPr lang="en-US" sz="1400" dirty="0">
+                <a:solidFill>
+                  <a:schemeClr val="accent1"/>
+                </a:solidFill>
+                <a:latin typeface="Arial" panose="020B0604020202020204" pitchFamily="34" charset="0"/>
+                <a:cs typeface="Arial" panose="020B0604020202020204" pitchFamily="34" charset="0"/>
+              </a:rPr>
+              <a:t> </a:t>
+            </a:r>
+            <a:r>
+              <a:rPr lang="en-US" sz="1400" dirty="0" smtClean="0">
+                <a:solidFill>
+                  <a:schemeClr val="accent1"/>
+                </a:solidFill>
+                <a:latin typeface="Arial" panose="020B0604020202020204" pitchFamily="34" charset="0"/>
+                <a:cs typeface="Arial" panose="020B0604020202020204" pitchFamily="34" charset="0"/>
+              </a:rPr>
+              <a:t>with multiple classifiers, mostly binary markers of presence/absence of features</a:t>
+            </a:r>
+            <a:br>
+              <a:rPr lang="en-US" sz="1400" dirty="0" smtClean="0">
+                <a:solidFill>
+                  <a:schemeClr val="accent1"/>
+                </a:solidFill>
+                <a:latin typeface="Arial" panose="020B0604020202020204" pitchFamily="34" charset="0"/>
+                <a:cs typeface="Arial" panose="020B0604020202020204" pitchFamily="34" charset="0"/>
+              </a:rPr>
+            </a:br>
+            <a:endParaRPr lang="en-US" sz="1400" dirty="0" smtClean="0">
+              <a:solidFill>
+                <a:schemeClr val="accent1"/>
+              </a:solidFill>
+              <a:latin typeface="Arial" panose="020B0604020202020204" pitchFamily="34" charset="0"/>
+              <a:cs typeface="Arial" panose="020B0604020202020204" pitchFamily="34" charset="0"/>
+            </a:endParaRPr>
+          </a:p>
+          <a:p>
+            <a:r>
+              <a:rPr lang="en-US" sz="1400" b="1" dirty="0" smtClean="0">
+                <a:solidFill>
+                  <a:schemeClr val="accent1"/>
+                </a:solidFill>
+                <a:latin typeface="Arial" panose="020B0604020202020204" pitchFamily="34" charset="0"/>
+                <a:cs typeface="Arial" panose="020B0604020202020204" pitchFamily="34" charset="0"/>
+              </a:rPr>
+              <a:t>Data: </a:t>
+            </a:r>
+            <a:r>
+              <a:rPr lang="en-US" sz="1400" dirty="0" smtClean="0">
+                <a:solidFill>
+                  <a:schemeClr val="accent1"/>
+                </a:solidFill>
+                <a:latin typeface="Arial" panose="020B0604020202020204" pitchFamily="34" charset="0"/>
+                <a:cs typeface="Arial" panose="020B0604020202020204" pitchFamily="34" charset="0"/>
+              </a:rPr>
+              <a:t>Already compiled 60,000 labeled images with data points contained in JSON structure</a:t>
+            </a:r>
+            <a:endParaRPr lang="en-US" sz="1400" b="1" dirty="0" smtClean="0">
+              <a:solidFill>
+                <a:schemeClr val="accent1"/>
+              </a:solidFill>
+              <a:latin typeface="Arial" panose="020B0604020202020204" pitchFamily="34" charset="0"/>
+              <a:cs typeface="Arial" panose="020B0604020202020204" pitchFamily="34" charset="0"/>
+            </a:endParaRPr>
+          </a:p>
+          <a:p>
+            <a:endParaRPr lang="en-US" sz="1400" b="1" dirty="0">
+              <a:solidFill>
+                <a:schemeClr val="accent1"/>
+              </a:solidFill>
+              <a:latin typeface="Arial" panose="020B0604020202020204" pitchFamily="34" charset="0"/>
+              <a:cs typeface="Arial" panose="020B0604020202020204" pitchFamily="34" charset="0"/>
+            </a:endParaRPr>
+          </a:p>
         </p:txBody>
       </p:sp>
       <p:sp>
@@ -6495,7 +6321,7 @@
         </p:nvSpPr>
         <p:spPr>
           <a:xfrm>
-            <a:off x="6138152" y="2497723"/>
+            <a:off x="6262843" y="1967786"/>
             <a:ext cx="4114209" cy="3754874"/>
           </a:xfrm>
           <a:prstGeom prst="rect">
@@ -6761,6 +6587,257 @@
     <p:extLst>
       <p:ext uri="{BB962C8B-B14F-4D97-AF65-F5344CB8AC3E}">
         <p14:creationId xmlns:p14="http://schemas.microsoft.com/office/powerpoint/2010/main" val="3585338971"/>
+      </p:ext>
+    </p:extLst>
+  </p:cSld>
+  <p:clrMapOvr>
+    <a:masterClrMapping/>
+  </p:clrMapOvr>
+  <p:timing>
+    <p:tnLst>
+      <p:par>
+        <p:cTn id="1" dur="indefinite" restart="never" nodeType="tmRoot"/>
+      </p:par>
+    </p:tnLst>
+  </p:timing>
+</p:sld>
+</file>
+
+<file path=ppt/slides/slide5.xml><?xml version="1.0" encoding="utf-8"?>
+<p:sld xmlns:a="http://schemas.openxmlformats.org/drawingml/2006/main" xmlns:r="http://schemas.openxmlformats.org/officeDocument/2006/relationships" xmlns:p="http://schemas.openxmlformats.org/presentationml/2006/main">
+  <p:cSld>
+    <p:spTree>
+      <p:nvGrpSpPr>
+        <p:cNvPr id="1" name=""/>
+        <p:cNvGrpSpPr/>
+        <p:nvPr/>
+      </p:nvGrpSpPr>
+      <p:grpSpPr>
+        <a:xfrm>
+          <a:off x="0" y="0"/>
+          <a:ext cx="0" cy="0"/>
+          <a:chOff x="0" y="0"/>
+          <a:chExt cx="0" cy="0"/>
+        </a:xfrm>
+      </p:grpSpPr>
+      <p:sp>
+        <p:nvSpPr>
+          <p:cNvPr id="4" name="Slide Number Placeholder 3"/>
+          <p:cNvSpPr>
+            <a:spLocks noGrp="1"/>
+          </p:cNvSpPr>
+          <p:nvPr>
+            <p:ph type="sldNum" sz="quarter" idx="12"/>
+          </p:nvPr>
+        </p:nvSpPr>
+        <p:spPr/>
+        <p:txBody>
+          <a:bodyPr/>
+          <a:lstStyle/>
+          <a:p>
+            <a:fld id="{B5C1F4F4-A082-40CA-B36A-B0C2125DDA09}" type="slidenum">
+              <a:rPr lang="en-US" smtClean="0"/>
+              <a:t>5</a:t>
+            </a:fld>
+            <a:endParaRPr lang="en-US"/>
+          </a:p>
+        </p:txBody>
+      </p:sp>
+      <p:sp>
+        <p:nvSpPr>
+          <p:cNvPr id="5" name="TextBox 4"/>
+          <p:cNvSpPr txBox="1"/>
+          <p:nvPr/>
+        </p:nvSpPr>
+        <p:spPr>
+          <a:xfrm>
+            <a:off x="609600" y="200025"/>
+            <a:ext cx="10972800" cy="400110"/>
+          </a:xfrm>
+          <a:prstGeom prst="rect">
+            <a:avLst/>
+          </a:prstGeom>
+          <a:noFill/>
+        </p:spPr>
+        <p:txBody>
+          <a:bodyPr wrap="square" rtlCol="0">
+            <a:spAutoFit/>
+          </a:bodyPr>
+          <a:lstStyle/>
+          <a:p>
+            <a:r>
+              <a:rPr lang="en-US" sz="2000" b="1" dirty="0" smtClean="0">
+                <a:solidFill>
+                  <a:schemeClr val="accent3"/>
+                </a:solidFill>
+                <a:latin typeface="Arial" panose="020B0604020202020204" pitchFamily="34" charset="0"/>
+                <a:cs typeface="Arial" panose="020B0604020202020204" pitchFamily="34" charset="0"/>
+              </a:rPr>
+              <a:t>Project Sidewalk – University of Maryland Seeks to Document accessibility</a:t>
+            </a:r>
+          </a:p>
+        </p:txBody>
+      </p:sp>
+      <p:sp>
+        <p:nvSpPr>
+          <p:cNvPr id="3" name="Content Placeholder 2"/>
+          <p:cNvSpPr>
+            <a:spLocks noGrp="1"/>
+          </p:cNvSpPr>
+          <p:nvPr>
+            <p:ph idx="1"/>
+          </p:nvPr>
+        </p:nvSpPr>
+        <p:spPr>
+          <a:xfrm>
+            <a:off x="6951518" y="1604168"/>
+            <a:ext cx="4630882" cy="4568031"/>
+          </a:xfrm>
+        </p:spPr>
+        <p:txBody>
+          <a:bodyPr/>
+          <a:lstStyle/>
+          <a:p>
+            <a:r>
+              <a:rPr lang="en-US" dirty="0" smtClean="0"/>
+              <a:t>Project combines Google Street View image data with crowd sourced labor to review intersections and document locations of curb cuts</a:t>
+            </a:r>
+          </a:p>
+          <a:p>
+            <a:endParaRPr lang="en-US" dirty="0"/>
+          </a:p>
+          <a:p>
+            <a:r>
+              <a:rPr lang="en-US" dirty="0" smtClean="0"/>
+              <a:t>Uses Java script online tool called “</a:t>
+            </a:r>
+            <a:r>
+              <a:rPr lang="en-US" dirty="0" err="1" smtClean="0"/>
+              <a:t>svLabel</a:t>
+            </a:r>
+            <a:r>
+              <a:rPr lang="en-US" dirty="0" smtClean="0"/>
+              <a:t>” to label features in images using a wire-frame style layer</a:t>
+            </a:r>
+          </a:p>
+          <a:p>
+            <a:endParaRPr lang="en-US" dirty="0"/>
+          </a:p>
+          <a:p>
+            <a:r>
+              <a:rPr lang="en-US" dirty="0" smtClean="0"/>
+              <a:t>Work in </a:t>
+            </a:r>
+            <a:r>
+              <a:rPr lang="en-US" dirty="0" err="1" smtClean="0"/>
+              <a:t>svLabel</a:t>
+            </a:r>
+            <a:r>
+              <a:rPr lang="en-US" dirty="0" smtClean="0"/>
+              <a:t> is followed by </a:t>
+            </a:r>
+            <a:r>
+              <a:rPr lang="en-US" dirty="0" err="1" smtClean="0"/>
+              <a:t>svDetect</a:t>
+            </a:r>
+            <a:r>
+              <a:rPr lang="en-US" dirty="0" smtClean="0"/>
+              <a:t> and </a:t>
+            </a:r>
+            <a:r>
+              <a:rPr lang="en-US" dirty="0" err="1" smtClean="0"/>
+              <a:t>svVerify</a:t>
+            </a:r>
+            <a:r>
+              <a:rPr lang="en-US" dirty="0" smtClean="0"/>
+              <a:t> to label additional images and then to verify outputs</a:t>
+            </a:r>
+          </a:p>
+          <a:p>
+            <a:endParaRPr lang="en-US" dirty="0"/>
+          </a:p>
+          <a:p>
+            <a:endParaRPr lang="en-US" dirty="0" smtClean="0"/>
+          </a:p>
+          <a:p>
+            <a:endParaRPr lang="en-US" dirty="0"/>
+          </a:p>
+        </p:txBody>
+      </p:sp>
+      <p:pic>
+        <p:nvPicPr>
+          <p:cNvPr id="7" name="Picture 6"/>
+          <p:cNvPicPr>
+            <a:picLocks noChangeAspect="1"/>
+          </p:cNvPicPr>
+          <p:nvPr/>
+        </p:nvPicPr>
+        <p:blipFill>
+          <a:blip r:embed="rId2"/>
+          <a:stretch>
+            <a:fillRect/>
+          </a:stretch>
+        </p:blipFill>
+        <p:spPr>
+          <a:xfrm>
+            <a:off x="103043" y="1504084"/>
+            <a:ext cx="6848475" cy="4133850"/>
+          </a:xfrm>
+          <a:prstGeom prst="rect">
+            <a:avLst/>
+          </a:prstGeom>
+        </p:spPr>
+      </p:pic>
+      <p:sp>
+        <p:nvSpPr>
+          <p:cNvPr id="8" name="TextBox 7"/>
+          <p:cNvSpPr txBox="1"/>
+          <p:nvPr/>
+        </p:nvSpPr>
+        <p:spPr>
+          <a:xfrm>
+            <a:off x="609600" y="6207853"/>
+            <a:ext cx="8693791" cy="215444"/>
+          </a:xfrm>
+          <a:prstGeom prst="rect">
+            <a:avLst/>
+          </a:prstGeom>
+          <a:noFill/>
+        </p:spPr>
+        <p:txBody>
+          <a:bodyPr wrap="square" rtlCol="0">
+            <a:spAutoFit/>
+          </a:bodyPr>
+          <a:lstStyle/>
+          <a:p>
+            <a:r>
+              <a:rPr lang="en-US" sz="800" dirty="0" smtClean="0"/>
+              <a:t>SOURCE: Hara, Sun, Moore et al: “</a:t>
+            </a:r>
+            <a:r>
+              <a:rPr lang="en-US" sz="800" dirty="0" err="1" smtClean="0"/>
+              <a:t>Tohme</a:t>
+            </a:r>
+            <a:r>
+              <a:rPr lang="en-US" sz="800" dirty="0" smtClean="0"/>
+              <a:t>: Detecting Curb Ramps in Google Street View Using Crowdsourcing, Computer Vision, and Machine Learning.”  </a:t>
+            </a:r>
+            <a:r>
+              <a:rPr lang="en-US" sz="800" i="1" dirty="0" smtClean="0"/>
+              <a:t>UIST ‘13, </a:t>
+            </a:r>
+            <a:r>
+              <a:rPr lang="en-US" sz="800" dirty="0" smtClean="0"/>
+              <a:t>Honolulu, HI.</a:t>
+            </a:r>
+            <a:endParaRPr lang="en-US" sz="800" dirty="0"/>
+          </a:p>
+        </p:txBody>
+      </p:sp>
+    </p:spTree>
+    <p:extLst>
+      <p:ext uri="{BB962C8B-B14F-4D97-AF65-F5344CB8AC3E}">
+        <p14:creationId xmlns:p14="http://schemas.microsoft.com/office/powerpoint/2010/main" val="673747806"/>
       </p:ext>
     </p:extLst>
   </p:cSld>
@@ -6948,7 +7025,7 @@
         </p:nvSpPr>
         <p:spPr>
           <a:xfrm>
-            <a:off x="8922328" y="1530120"/>
+            <a:off x="8922328" y="1540511"/>
             <a:ext cx="230909" cy="307777"/>
           </a:xfrm>
           <a:prstGeom prst="rect">
@@ -6966,7 +7043,7 @@
             <a:r>
               <a:rPr lang="en-US" sz="1400" b="1" dirty="0">
                 <a:solidFill>
-                  <a:schemeClr val="accent1"/>
+                  <a:srgbClr val="354CA1"/>
                 </a:solidFill>
                 <a:latin typeface="Arial" panose="020B0604020202020204" pitchFamily="34" charset="0"/>
                 <a:cs typeface="Arial" panose="020B0604020202020204" pitchFamily="34" charset="0"/>
@@ -6984,7 +7061,7 @@
         </p:nvSpPr>
         <p:spPr>
           <a:xfrm>
-            <a:off x="9153237" y="1539279"/>
+            <a:off x="9153237" y="1549670"/>
             <a:ext cx="1985818" cy="307777"/>
           </a:xfrm>
           <a:prstGeom prst="rect">
@@ -6999,7 +7076,11 @@
           <a:lstStyle/>
           <a:p>
             <a:r>
-              <a:rPr lang="en-US" sz="1400" dirty="0"/>
+              <a:rPr lang="en-US" sz="1400" dirty="0">
+                <a:solidFill>
+                  <a:srgbClr val="354CA1"/>
+                </a:solidFill>
+              </a:rPr>
               <a:t>Identify sidewalk</a:t>
             </a:r>
           </a:p>
@@ -7016,7 +7097,7 @@
         </p:nvCxnSpPr>
         <p:spPr>
           <a:xfrm flipV="1">
-            <a:off x="6982691" y="1684009"/>
+            <a:off x="6982691" y="1694400"/>
             <a:ext cx="1939637" cy="1484064"/>
           </a:xfrm>
           <a:prstGeom prst="line">
@@ -7052,7 +7133,7 @@
         </p:nvSpPr>
         <p:spPr>
           <a:xfrm>
-            <a:off x="8917710" y="2504557"/>
+            <a:off x="8917710" y="2514948"/>
             <a:ext cx="230909" cy="307777"/>
           </a:xfrm>
           <a:prstGeom prst="rect">
@@ -7070,7 +7151,7 @@
             <a:r>
               <a:rPr lang="en-US" sz="1400" b="1" dirty="0">
                 <a:solidFill>
-                  <a:schemeClr val="accent2"/>
+                  <a:srgbClr val="354CA1"/>
                 </a:solidFill>
                 <a:latin typeface="Arial" panose="020B0604020202020204" pitchFamily="34" charset="0"/>
                 <a:cs typeface="Arial" panose="020B0604020202020204" pitchFamily="34" charset="0"/>
@@ -7088,7 +7169,7 @@
         </p:nvSpPr>
         <p:spPr>
           <a:xfrm>
-            <a:off x="9148619" y="2510708"/>
+            <a:off x="9148619" y="2521099"/>
             <a:ext cx="1985818" cy="738664"/>
           </a:xfrm>
           <a:prstGeom prst="rect">
@@ -7103,21 +7184,37 @@
           <a:lstStyle/>
           <a:p>
             <a:r>
-              <a:rPr lang="en-US" sz="1400" dirty="0"/>
+              <a:rPr lang="en-US" sz="1400" dirty="0">
+                <a:solidFill>
+                  <a:srgbClr val="354CA1"/>
+                </a:solidFill>
+              </a:rPr>
               <a:t>Identify obstacles</a:t>
             </a:r>
           </a:p>
           <a:p>
             <a:r>
-              <a:rPr lang="en-US" sz="1400" dirty="0"/>
+              <a:rPr lang="en-US" sz="1400" dirty="0">
+                <a:solidFill>
+                  <a:srgbClr val="354CA1"/>
+                </a:solidFill>
+              </a:rPr>
               <a:t>(ex: telephone pole, shrub, </a:t>
             </a:r>
             <a:r>
-              <a:rPr lang="en-US" sz="1400" dirty="0" err="1"/>
+              <a:rPr lang="en-US" sz="1400" dirty="0" err="1">
+                <a:solidFill>
+                  <a:srgbClr val="354CA1"/>
+                </a:solidFill>
+              </a:rPr>
               <a:t>etc</a:t>
             </a:r>
             <a:r>
-              <a:rPr lang="en-US" sz="1400" dirty="0"/>
+              <a:rPr lang="en-US" sz="1400" dirty="0">
+                <a:solidFill>
+                  <a:srgbClr val="354CA1"/>
+                </a:solidFill>
+              </a:rPr>
               <a:t>)</a:t>
             </a:r>
           </a:p>
@@ -7134,7 +7231,7 @@
         </p:nvCxnSpPr>
         <p:spPr>
           <a:xfrm>
-            <a:off x="6453830" y="2390958"/>
+            <a:off x="6453830" y="2401349"/>
             <a:ext cx="2463880" cy="267488"/>
           </a:xfrm>
           <a:prstGeom prst="line">
@@ -7266,7 +7363,7 @@
         </p:nvSpPr>
         <p:spPr>
           <a:xfrm>
-            <a:off x="8931565" y="3903864"/>
+            <a:off x="8931565" y="3914255"/>
             <a:ext cx="230909" cy="307777"/>
           </a:xfrm>
           <a:prstGeom prst="rect">
@@ -7284,7 +7381,7 @@
             <a:r>
               <a:rPr lang="en-US" sz="1400" b="1" dirty="0">
                 <a:solidFill>
-                  <a:schemeClr val="tx2"/>
+                  <a:srgbClr val="354CA1"/>
                 </a:solidFill>
                 <a:latin typeface="Arial" panose="020B0604020202020204" pitchFamily="34" charset="0"/>
                 <a:cs typeface="Arial" panose="020B0604020202020204" pitchFamily="34" charset="0"/>
@@ -7302,7 +7399,7 @@
         </p:nvSpPr>
         <p:spPr>
           <a:xfrm>
-            <a:off x="9162474" y="3913023"/>
+            <a:off x="9162474" y="3923414"/>
             <a:ext cx="1985818" cy="307777"/>
           </a:xfrm>
           <a:prstGeom prst="rect">
@@ -7317,7 +7414,11 @@
           <a:lstStyle/>
           <a:p>
             <a:r>
-              <a:rPr lang="en-US" sz="1400" dirty="0"/>
+              <a:rPr lang="en-US" sz="1400" dirty="0">
+                <a:solidFill>
+                  <a:srgbClr val="354CA1"/>
+                </a:solidFill>
+              </a:rPr>
               <a:t>Find and flag bad data</a:t>
             </a:r>
           </a:p>
@@ -7492,7 +7593,7 @@
         </p:nvCxnSpPr>
         <p:spPr>
           <a:xfrm>
-            <a:off x="4805696" y="2522354"/>
+            <a:off x="4805696" y="2532745"/>
             <a:ext cx="4125869" cy="1535399"/>
           </a:xfrm>
           <a:prstGeom prst="line">
@@ -7533,7 +7634,7 @@
         <p:spPr>
           <a:xfrm>
             <a:off x="2342381" y="3926028"/>
-            <a:ext cx="6589184" cy="131725"/>
+            <a:ext cx="6589184" cy="142116"/>
           </a:xfrm>
           <a:prstGeom prst="line">
             <a:avLst/>
@@ -7629,7 +7730,7 @@
         <p:spPr>
           <a:xfrm>
             <a:off x="609600" y="200025"/>
-            <a:ext cx="10972800" cy="400110"/>
+            <a:ext cx="10972800" cy="461665"/>
           </a:xfrm>
           <a:prstGeom prst="rect">
             <a:avLst/>
@@ -7643,14 +7744,14 @@
           <a:lstStyle/>
           <a:p>
             <a:r>
-              <a:rPr lang="en-US" sz="2000" b="1" dirty="0" smtClean="0">
+              <a:rPr lang="en-US" sz="2400" b="1" dirty="0">
                 <a:solidFill>
                   <a:schemeClr val="accent3"/>
                 </a:solidFill>
                 <a:latin typeface="Arial" panose="020B0604020202020204" pitchFamily="34" charset="0"/>
                 <a:cs typeface="Arial" panose="020B0604020202020204" pitchFamily="34" charset="0"/>
               </a:rPr>
-              <a:t>Project Sidewalk – University of Maryland Seeks to Document accessibility</a:t>
+              <a:t>Data Sourcing</a:t>
             </a:r>
           </a:p>
         </p:txBody>
@@ -7665,69 +7766,86 @@
             <p:ph idx="1"/>
           </p:nvPr>
         </p:nvSpPr>
-        <p:spPr>
-          <a:xfrm>
-            <a:off x="6951518" y="1604168"/>
-            <a:ext cx="4630882" cy="4568031"/>
-          </a:xfrm>
-        </p:spPr>
+        <p:spPr/>
         <p:txBody>
           <a:bodyPr/>
           <a:lstStyle/>
           <a:p>
             <a:r>
               <a:rPr lang="en-US" dirty="0" smtClean="0"/>
-              <a:t>Project combines Google Street View image data with crowd sourced labor to review intersections and document locations of curb cuts</a:t>
-            </a:r>
-          </a:p>
-          <a:p>
+              <a:t>University of Maryland Project Sidewalk</a:t>
+            </a:r>
+          </a:p>
+          <a:p>
+            <a:pPr lvl="1"/>
+            <a:r>
+              <a:rPr lang="en-US" dirty="0" smtClean="0"/>
+              <a:t>Approximately 60,000 labels for Google Street View sourced images</a:t>
+            </a:r>
+          </a:p>
+          <a:p>
+            <a:pPr lvl="1"/>
+            <a:r>
+              <a:rPr lang="en-US" dirty="0" smtClean="0"/>
+              <a:t>Labels contain binary indication </a:t>
+            </a:r>
             <a:endParaRPr lang="en-US" dirty="0"/>
           </a:p>
           <a:p>
             <a:r>
               <a:rPr lang="en-US" dirty="0" smtClean="0"/>
-              <a:t>Uses Java script online tool called “</a:t>
+              <a:t>Open Street Map/</a:t>
             </a:r>
             <a:r>
               <a:rPr lang="en-US" dirty="0" err="1" smtClean="0"/>
-              <a:t>svLabel</a:t>
-            </a:r>
+              <a:t>Mapzen</a:t>
+            </a:r>
+            <a:endParaRPr lang="en-US" dirty="0" smtClean="0"/>
+          </a:p>
+          <a:p>
+            <a:pPr lvl="1"/>
             <a:r>
               <a:rPr lang="en-US" dirty="0" smtClean="0"/>
-              <a:t>” to label features in images using a wire-frame style layer</a:t>
-            </a:r>
-          </a:p>
-          <a:p>
+              <a:t>Open Street Map is a </a:t>
+            </a:r>
+            <a:r>
+              <a:rPr lang="en-US" dirty="0" err="1" smtClean="0"/>
+              <a:t>crowdsourced</a:t>
+            </a:r>
+            <a:r>
+              <a:rPr lang="en-US" dirty="0" smtClean="0"/>
+              <a:t> project that has most</a:t>
+            </a:r>
+          </a:p>
+          <a:p>
+            <a:pPr lvl="1"/>
             <a:endParaRPr lang="en-US" dirty="0"/>
           </a:p>
           <a:p>
             <a:r>
               <a:rPr lang="en-US" dirty="0" smtClean="0"/>
-              <a:t>Work in </a:t>
+              <a:t>Dallas </a:t>
             </a:r>
             <a:r>
               <a:rPr lang="en-US" dirty="0" err="1" smtClean="0"/>
-              <a:t>svLabel</a:t>
+              <a:t>OpenData</a:t>
             </a:r>
             <a:r>
               <a:rPr lang="en-US" dirty="0" smtClean="0"/>
-              <a:t> is followed by </a:t>
-            </a:r>
+              <a:t> 311 Requests</a:t>
+            </a:r>
+          </a:p>
+          <a:p>
+            <a:endParaRPr lang="en-US" dirty="0"/>
+          </a:p>
+          <a:p>
             <a:r>
               <a:rPr lang="en-US" dirty="0" err="1" smtClean="0"/>
-              <a:t>svDetect</a:t>
+              <a:t>MapMyRun</a:t>
             </a:r>
             <a:r>
               <a:rPr lang="en-US" dirty="0" smtClean="0"/>
-              <a:t> and </a:t>
-            </a:r>
-            <a:r>
-              <a:rPr lang="en-US" dirty="0" err="1" smtClean="0"/>
-              <a:t>svVerify</a:t>
-            </a:r>
-            <a:r>
-              <a:rPr lang="en-US" dirty="0" smtClean="0"/>
-              <a:t> to label additional images and then to verify outputs</a:t>
+              <a:t> User GPS Tracks</a:t>
             </a:r>
           </a:p>
           <a:p>
@@ -7735,86 +7853,13 @@
           </a:p>
           <a:p>
             <a:endParaRPr lang="en-US" dirty="0" smtClean="0"/>
-          </a:p>
-          <a:p>
-            <a:endParaRPr lang="en-US" dirty="0"/>
-          </a:p>
-        </p:txBody>
-      </p:sp>
-      <p:pic>
-        <p:nvPicPr>
-          <p:cNvPr id="7" name="Picture 6"/>
-          <p:cNvPicPr>
-            <a:picLocks noChangeAspect="1"/>
-          </p:cNvPicPr>
-          <p:nvPr/>
-        </p:nvPicPr>
-        <p:blipFill>
-          <a:blip r:embed="rId2"/>
-          <a:stretch>
-            <a:fillRect/>
-          </a:stretch>
-        </p:blipFill>
-        <p:spPr>
-          <a:xfrm>
-            <a:off x="103043" y="1504084"/>
-            <a:ext cx="6848475" cy="4133850"/>
-          </a:xfrm>
-          <a:prstGeom prst="rect">
-            <a:avLst/>
-          </a:prstGeom>
-        </p:spPr>
-      </p:pic>
-      <p:sp>
-        <p:nvSpPr>
-          <p:cNvPr id="8" name="TextBox 7"/>
-          <p:cNvSpPr txBox="1"/>
-          <p:nvPr/>
-        </p:nvSpPr>
-        <p:spPr>
-          <a:xfrm>
-            <a:off x="609600" y="6207853"/>
-            <a:ext cx="8693791" cy="215444"/>
-          </a:xfrm>
-          <a:prstGeom prst="rect">
-            <a:avLst/>
-          </a:prstGeom>
-          <a:noFill/>
-        </p:spPr>
-        <p:txBody>
-          <a:bodyPr wrap="square" rtlCol="0">
-            <a:spAutoFit/>
-          </a:bodyPr>
-          <a:lstStyle/>
-          <a:p>
-            <a:r>
-              <a:rPr lang="en-US" sz="800" dirty="0" smtClean="0"/>
-              <a:t>SOURCE: Hara, Sun, Moore et al: “</a:t>
-            </a:r>
-            <a:r>
-              <a:rPr lang="en-US" sz="800" dirty="0" err="1" smtClean="0"/>
-              <a:t>Tohme</a:t>
-            </a:r>
-            <a:r>
-              <a:rPr lang="en-US" sz="800" dirty="0" smtClean="0"/>
-              <a:t>: Detecting Curb Ramps in Google Street View Using Crowdsourcing, Computer Vision, and Machine Learning.”  </a:t>
-            </a:r>
-            <a:r>
-              <a:rPr lang="en-US" sz="800" i="1" dirty="0" smtClean="0"/>
-              <a:t>UIST ‘13, </a:t>
-            </a:r>
-            <a:r>
-              <a:rPr lang="en-US" sz="800" dirty="0" smtClean="0"/>
-              <a:t>Honolulu, HI.</a:t>
-            </a:r>
-            <a:endParaRPr lang="en-US" sz="800" dirty="0"/>
           </a:p>
         </p:txBody>
       </p:sp>
     </p:spTree>
     <p:extLst>
       <p:ext uri="{BB962C8B-B14F-4D97-AF65-F5344CB8AC3E}">
-        <p14:creationId xmlns:p14="http://schemas.microsoft.com/office/powerpoint/2010/main" val="673747806"/>
+        <p14:creationId xmlns:p14="http://schemas.microsoft.com/office/powerpoint/2010/main" val="3496869599"/>
       </p:ext>
     </p:extLst>
   </p:cSld>
@@ -7901,111 +7946,39 @@
                 <a:latin typeface="Arial" panose="020B0604020202020204" pitchFamily="34" charset="0"/>
                 <a:cs typeface="Arial" panose="020B0604020202020204" pitchFamily="34" charset="0"/>
               </a:rPr>
-              <a:t>Data Sourcing</a:t>
-            </a:r>
-          </a:p>
-        </p:txBody>
-      </p:sp>
-      <p:sp>
-        <p:nvSpPr>
-          <p:cNvPr id="3" name="Content Placeholder 2"/>
-          <p:cNvSpPr>
-            <a:spLocks noGrp="1"/>
-          </p:cNvSpPr>
+              <a:t>Project Plan</a:t>
+            </a:r>
+          </a:p>
+        </p:txBody>
+      </p:sp>
+      <p:graphicFrame>
+        <p:nvGraphicFramePr>
+          <p:cNvPr id="6" name="Chart 5"/>
+          <p:cNvGraphicFramePr>
+            <a:graphicFrameLocks/>
+          </p:cNvGraphicFramePr>
           <p:nvPr>
-            <p:ph idx="1"/>
+            <p:extLst>
+              <p:ext uri="{D42A27DB-BD31-4B8C-83A1-F6EECF244321}">
+                <p14:modId xmlns:p14="http://schemas.microsoft.com/office/powerpoint/2010/main" val="961593459"/>
+              </p:ext>
+            </p:extLst>
           </p:nvPr>
-        </p:nvSpPr>
-        <p:spPr/>
-        <p:txBody>
-          <a:bodyPr/>
-          <a:lstStyle/>
-          <a:p>
-            <a:r>
-              <a:rPr lang="en-US" dirty="0" smtClean="0"/>
-              <a:t>Google Street View API</a:t>
-            </a:r>
-          </a:p>
-          <a:p>
-            <a:pPr lvl="1"/>
-            <a:r>
-              <a:rPr lang="en-US" dirty="0" smtClean="0"/>
-              <a:t>Terms of use allow for scraping image data for Street View</a:t>
-            </a:r>
-          </a:p>
-          <a:p>
-            <a:pPr lvl="1"/>
-            <a:endParaRPr lang="en-US" dirty="0"/>
-          </a:p>
-          <a:p>
-            <a:r>
-              <a:rPr lang="en-US" dirty="0" smtClean="0"/>
-              <a:t>Open Street Map/</a:t>
-            </a:r>
-            <a:r>
-              <a:rPr lang="en-US" dirty="0" err="1" smtClean="0"/>
-              <a:t>Mapzen</a:t>
-            </a:r>
-            <a:endParaRPr lang="en-US" dirty="0" smtClean="0"/>
-          </a:p>
-          <a:p>
-            <a:pPr lvl="1"/>
-            <a:r>
-              <a:rPr lang="en-US" dirty="0" smtClean="0"/>
-              <a:t>Open Street Map is a </a:t>
-            </a:r>
-            <a:r>
-              <a:rPr lang="en-US" dirty="0" err="1" smtClean="0"/>
-              <a:t>crowdsourced</a:t>
-            </a:r>
-            <a:r>
-              <a:rPr lang="en-US" dirty="0" smtClean="0"/>
-              <a:t> project that has most</a:t>
-            </a:r>
-          </a:p>
-          <a:p>
-            <a:pPr lvl="1"/>
-            <a:endParaRPr lang="en-US" dirty="0"/>
-          </a:p>
-          <a:p>
-            <a:r>
-              <a:rPr lang="en-US" dirty="0" smtClean="0"/>
-              <a:t>Dallas </a:t>
-            </a:r>
-            <a:r>
-              <a:rPr lang="en-US" dirty="0" err="1" smtClean="0"/>
-              <a:t>OpenData</a:t>
-            </a:r>
-            <a:r>
-              <a:rPr lang="en-US" dirty="0" smtClean="0"/>
-              <a:t> 311 Requests</a:t>
-            </a:r>
-          </a:p>
-          <a:p>
-            <a:endParaRPr lang="en-US" dirty="0"/>
-          </a:p>
-          <a:p>
-            <a:r>
-              <a:rPr lang="en-US" dirty="0" err="1" smtClean="0"/>
-              <a:t>MapMyRun</a:t>
-            </a:r>
-            <a:r>
-              <a:rPr lang="en-US" dirty="0" smtClean="0"/>
-              <a:t> User GPS Tracks</a:t>
-            </a:r>
-          </a:p>
-          <a:p>
-            <a:endParaRPr lang="en-US" dirty="0"/>
-          </a:p>
-          <a:p>
-            <a:endParaRPr lang="en-US" dirty="0" smtClean="0"/>
-          </a:p>
-        </p:txBody>
-      </p:sp>
+        </p:nvGraphicFramePr>
+        <p:xfrm>
+          <a:off x="1047750" y="661690"/>
+          <a:ext cx="10096500" cy="5486400"/>
+        </p:xfrm>
+        <a:graphic>
+          <a:graphicData uri="http://schemas.openxmlformats.org/drawingml/2006/chart">
+            <c:chart xmlns:c="http://schemas.openxmlformats.org/drawingml/2006/chart" xmlns:r="http://schemas.openxmlformats.org/officeDocument/2006/relationships" r:id="rId2"/>
+          </a:graphicData>
+        </a:graphic>
+      </p:graphicFrame>
     </p:spTree>
     <p:extLst>
       <p:ext uri="{BB962C8B-B14F-4D97-AF65-F5344CB8AC3E}">
-        <p14:creationId xmlns:p14="http://schemas.microsoft.com/office/powerpoint/2010/main" val="3496869599"/>
+        <p14:creationId xmlns:p14="http://schemas.microsoft.com/office/powerpoint/2010/main" val="434888552"/>
       </p:ext>
     </p:extLst>
   </p:cSld>
@@ -8041,6 +8014,113 @@
       </p:grpSpPr>
       <p:sp>
         <p:nvSpPr>
+          <p:cNvPr id="2" name="Content Placeholder 1"/>
+          <p:cNvSpPr>
+            <a:spLocks noGrp="1"/>
+          </p:cNvSpPr>
+          <p:nvPr>
+            <p:ph idx="1"/>
+          </p:nvPr>
+        </p:nvSpPr>
+        <p:spPr>
+          <a:xfrm>
+            <a:off x="609600" y="1080293"/>
+            <a:ext cx="10972800" cy="4568031"/>
+          </a:xfrm>
+        </p:spPr>
+        <p:txBody>
+          <a:bodyPr>
+            <a:normAutofit/>
+          </a:bodyPr>
+          <a:lstStyle/>
+          <a:p>
+            <a:r>
+              <a:rPr lang="en-US" dirty="0" smtClean="0"/>
+              <a:t>Creation of an adequate data set of labeled/</a:t>
+            </a:r>
+            <a:r>
+              <a:rPr lang="en-US" dirty="0" err="1" smtClean="0"/>
+              <a:t>wireframed</a:t>
+            </a:r>
+            <a:r>
+              <a:rPr lang="en-US" dirty="0" smtClean="0"/>
+              <a:t> images for training model</a:t>
+            </a:r>
+          </a:p>
+          <a:p>
+            <a:pPr lvl="1"/>
+            <a:r>
+              <a:rPr lang="en-US" dirty="0" smtClean="0"/>
+              <a:t>This is a lot of hands on time!</a:t>
+            </a:r>
+          </a:p>
+          <a:p>
+            <a:pPr lvl="1"/>
+            <a:r>
+              <a:rPr lang="en-US" dirty="0" smtClean="0"/>
+              <a:t>There’s probably a best method of performing this task, that we hope to uncover through prior research</a:t>
+            </a:r>
+          </a:p>
+          <a:p>
+            <a:pPr lvl="1"/>
+            <a:endParaRPr lang="en-US" sz="1600" dirty="0"/>
+          </a:p>
+          <a:p>
+            <a:r>
+              <a:rPr lang="en-US" dirty="0" smtClean="0"/>
+              <a:t>Integration with prior data collection from UMD Project Sidewalk team</a:t>
+            </a:r>
+          </a:p>
+          <a:p>
+            <a:pPr lvl="1"/>
+            <a:r>
+              <a:rPr lang="en-US" dirty="0" smtClean="0"/>
+              <a:t>Existing base of ~67,000 labeled images</a:t>
+            </a:r>
+          </a:p>
+          <a:p>
+            <a:pPr lvl="1"/>
+            <a:endParaRPr lang="en-US" dirty="0"/>
+          </a:p>
+          <a:p>
+            <a:r>
+              <a:rPr lang="en-US" dirty="0" smtClean="0"/>
+              <a:t>Learning the available convolutional neural network </a:t>
+            </a:r>
+            <a:r>
+              <a:rPr lang="en-US" dirty="0" smtClean="0"/>
+              <a:t>libraries/packages to train the model</a:t>
+            </a:r>
+          </a:p>
+          <a:p>
+            <a:endParaRPr lang="en-US" sz="1600" dirty="0"/>
+          </a:p>
+          <a:p>
+            <a:r>
+              <a:rPr lang="en-US" dirty="0" smtClean="0"/>
+              <a:t>Development of Method that’s scalable to a full city</a:t>
+            </a:r>
+            <a:endParaRPr lang="en-US" dirty="0"/>
+          </a:p>
+          <a:p>
+            <a:pPr lvl="1"/>
+            <a:endParaRPr lang="en-US" sz="1600" dirty="0" smtClean="0"/>
+          </a:p>
+          <a:p>
+            <a:pPr lvl="1"/>
+            <a:endParaRPr lang="en-US" sz="1600" dirty="0"/>
+          </a:p>
+          <a:p>
+            <a:pPr lvl="1"/>
+            <a:endParaRPr lang="en-US" sz="1600" dirty="0"/>
+          </a:p>
+          <a:p>
+            <a:endParaRPr lang="en-US" sz="1800" dirty="0"/>
+          </a:p>
+        </p:txBody>
+      </p:sp>
+      <p:sp>
+        <p:nvSpPr>
           <p:cNvPr id="4" name="Slide Number Placeholder 3"/>
           <p:cNvSpPr>
             <a:spLocks noGrp="1"/>
@@ -8085,46 +8165,29 @@
           <a:lstStyle/>
           <a:p>
             <a:r>
-              <a:rPr lang="en-US" sz="2400" b="1" dirty="0">
+              <a:rPr lang="en-US" sz="2400" b="1" dirty="0" smtClean="0">
                 <a:solidFill>
                   <a:schemeClr val="accent3"/>
                 </a:solidFill>
                 <a:latin typeface="Arial" panose="020B0604020202020204" pitchFamily="34" charset="0"/>
                 <a:cs typeface="Arial" panose="020B0604020202020204" pitchFamily="34" charset="0"/>
               </a:rPr>
-              <a:t>Project Plan</a:t>
-            </a:r>
-          </a:p>
-        </p:txBody>
-      </p:sp>
-      <p:graphicFrame>
-        <p:nvGraphicFramePr>
-          <p:cNvPr id="6" name="Chart 5"/>
-          <p:cNvGraphicFramePr>
-            <a:graphicFrameLocks/>
-          </p:cNvGraphicFramePr>
-          <p:nvPr>
-            <p:extLst>
-              <p:ext uri="{D42A27DB-BD31-4B8C-83A1-F6EECF244321}">
-                <p14:modId xmlns:p14="http://schemas.microsoft.com/office/powerpoint/2010/main" val="961593459"/>
-              </p:ext>
-            </p:extLst>
-          </p:nvPr>
-        </p:nvGraphicFramePr>
-        <p:xfrm>
-          <a:off x="1047750" y="661690"/>
-          <a:ext cx="10096500" cy="5486400"/>
-        </p:xfrm>
-        <a:graphic>
-          <a:graphicData uri="http://schemas.openxmlformats.org/drawingml/2006/chart">
-            <c:chart xmlns:c="http://schemas.openxmlformats.org/drawingml/2006/chart" xmlns:r="http://schemas.openxmlformats.org/officeDocument/2006/relationships" r:id="rId2"/>
-          </a:graphicData>
-        </a:graphic>
-      </p:graphicFrame>
+              <a:t>Major Steps</a:t>
+            </a:r>
+            <a:endParaRPr lang="en-US" sz="2400" b="1" dirty="0">
+              <a:solidFill>
+                <a:schemeClr val="accent3"/>
+              </a:solidFill>
+              <a:latin typeface="Arial" panose="020B0604020202020204" pitchFamily="34" charset="0"/>
+              <a:cs typeface="Arial" panose="020B0604020202020204" pitchFamily="34" charset="0"/>
+            </a:endParaRPr>
+          </a:p>
+        </p:txBody>
+      </p:sp>
     </p:spTree>
     <p:extLst>
       <p:ext uri="{BB962C8B-B14F-4D97-AF65-F5344CB8AC3E}">
-        <p14:creationId xmlns:p14="http://schemas.microsoft.com/office/powerpoint/2010/main" val="434888552"/>
+        <p14:creationId xmlns:p14="http://schemas.microsoft.com/office/powerpoint/2010/main" val="3263685899"/>
       </p:ext>
     </p:extLst>
   </p:cSld>
@@ -9019,7 +9082,7 @@
 </file>
 
 <file path=customXml/itemProps1.xml><?xml version="1.0" encoding="utf-8"?>
-<ds:datastoreItem xmlns:ds="http://schemas.openxmlformats.org/officeDocument/2006/customXml" ds:itemID="{F2EBFCF9-D869-4614-AEAC-D83618EE55BC}">
+<ds:datastoreItem xmlns:ds="http://schemas.openxmlformats.org/officeDocument/2006/customXml" ds:itemID="{2D6F31BE-4BB8-4B5D-A4A5-57061F186AD8}">
   <ds:schemaRefs>
     <ds:schemaRef ds:uri="ESRI.ArcGIS.Mapping.OfficeIntegration.PowerPointInfo"/>
   </ds:schemaRefs>
@@ -9035,7 +9098,7 @@
 </file>
 
 <file path=customXml/itemProps3.xml><?xml version="1.0" encoding="utf-8"?>
-<ds:datastoreItem xmlns:ds="http://schemas.openxmlformats.org/officeDocument/2006/customXml" ds:itemID="{2D6F31BE-4BB8-4B5D-A4A5-57061F186AD8}">
+<ds:datastoreItem xmlns:ds="http://schemas.openxmlformats.org/officeDocument/2006/customXml" ds:itemID="{F2EBFCF9-D869-4614-AEAC-D83618EE55BC}">
   <ds:schemaRefs>
     <ds:schemaRef ds:uri="ESRI.ArcGIS.Mapping.OfficeIntegration.PowerPointInfo"/>
   </ds:schemaRefs>
@@ -9043,7 +9106,7 @@
 </file>
 
 <file path=customXml/itemProps4.xml><?xml version="1.0" encoding="utf-8"?>
-<ds:datastoreItem xmlns:ds="http://schemas.openxmlformats.org/officeDocument/2006/customXml" ds:itemID="{FD621DE6-4AFC-42C2-9FEA-A2F29F62D504}">
+<ds:datastoreItem xmlns:ds="http://schemas.openxmlformats.org/officeDocument/2006/customXml" ds:itemID="{AC5295A4-0A14-409D-B8F0-83175CBFB9E2}">
   <ds:schemaRefs>
     <ds:schemaRef ds:uri="ESRI.ArcGIS.Mapping.OfficeIntegration.PowerPointInfo"/>
   </ds:schemaRefs>
@@ -9051,7 +9114,7 @@
 </file>
 
 <file path=customXml/itemProps5.xml><?xml version="1.0" encoding="utf-8"?>
-<ds:datastoreItem xmlns:ds="http://schemas.openxmlformats.org/officeDocument/2006/customXml" ds:itemID="{AC5295A4-0A14-409D-B8F0-83175CBFB9E2}">
+<ds:datastoreItem xmlns:ds="http://schemas.openxmlformats.org/officeDocument/2006/customXml" ds:itemID="{866DBFDA-7730-4277-949E-91D419D33EF7}">
   <ds:schemaRefs>
     <ds:schemaRef ds:uri="ESRI.ArcGIS.Mapping.OfficeIntegration.PowerPointInfo"/>
   </ds:schemaRefs>

</xml_diff>